<commit_message>
Modified the .pptx file.
</commit_message>
<xml_diff>
--- a/Group-01-Semsester-Form-Fill-Up-System.pptx
+++ b/Group-01-Semsester-Form-Fill-Up-System.pptx
@@ -241,7 +241,7 @@
           <a:p>
             <a:fld id="{9F5B72FF-C81D-407A-93C2-E9D64D29F837}" type="datetimeFigureOut">
               <a:rPr lang="en-US" smtClean="0"/>
-              <a:t>12-Feb-19</a:t>
+              <a:t>24-Feb-19</a:t>
             </a:fld>
             <a:endParaRPr lang="en-US"/>
           </a:p>
@@ -808,7 +808,7 @@
           <a:p>
             <a:fld id="{3171C7A2-A531-4824-AA77-C5182AC37427}" type="datetimeFigureOut">
               <a:rPr lang="en-US" smtClean="0"/>
-              <a:t>12-Feb-19</a:t>
+              <a:t>24-Feb-19</a:t>
             </a:fld>
             <a:endParaRPr lang="en-US"/>
           </a:p>
@@ -978,7 +978,7 @@
           <a:p>
             <a:fld id="{3171C7A2-A531-4824-AA77-C5182AC37427}" type="datetimeFigureOut">
               <a:rPr lang="en-US" smtClean="0"/>
-              <a:t>12-Feb-19</a:t>
+              <a:t>24-Feb-19</a:t>
             </a:fld>
             <a:endParaRPr lang="en-US"/>
           </a:p>
@@ -1158,7 +1158,7 @@
           <a:p>
             <a:fld id="{3171C7A2-A531-4824-AA77-C5182AC37427}" type="datetimeFigureOut">
               <a:rPr lang="en-US" smtClean="0"/>
-              <a:t>12-Feb-19</a:t>
+              <a:t>24-Feb-19</a:t>
             </a:fld>
             <a:endParaRPr lang="en-US"/>
           </a:p>
@@ -1715,7 +1715,7 @@
                 </a:solidFill>
               </a:rPr>
               <a:pPr/>
-              <a:t>12-Feb-19</a:t>
+              <a:t>24-Feb-19</a:t>
             </a:fld>
             <a:endParaRPr lang="en-US">
               <a:solidFill>
@@ -1940,7 +1940,7 @@
                 </a:solidFill>
               </a:rPr>
               <a:pPr/>
-              <a:t>12-Feb-19</a:t>
+              <a:t>24-Feb-19</a:t>
             </a:fld>
             <a:endParaRPr lang="en-US">
               <a:solidFill>
@@ -2198,7 +2198,7 @@
                 </a:solidFill>
               </a:rPr>
               <a:pPr/>
-              <a:t>12-Feb-19</a:t>
+              <a:t>24-Feb-19</a:t>
             </a:fld>
             <a:endParaRPr lang="en-US">
               <a:solidFill>
@@ -2520,7 +2520,7 @@
                 </a:solidFill>
               </a:rPr>
               <a:pPr/>
-              <a:t>12-Feb-19</a:t>
+              <a:t>24-Feb-19</a:t>
             </a:fld>
             <a:endParaRPr lang="en-US">
               <a:solidFill>
@@ -2982,7 +2982,7 @@
                 </a:solidFill>
               </a:rPr>
               <a:pPr/>
-              <a:t>12-Feb-19</a:t>
+              <a:t>24-Feb-19</a:t>
             </a:fld>
             <a:endParaRPr lang="en-US">
               <a:solidFill>
@@ -3134,7 +3134,7 @@
                 </a:solidFill>
               </a:rPr>
               <a:pPr/>
-              <a:t>12-Feb-19</a:t>
+              <a:t>24-Feb-19</a:t>
             </a:fld>
             <a:endParaRPr lang="en-US">
               <a:solidFill>
@@ -3263,7 +3263,7 @@
                 </a:solidFill>
               </a:rPr>
               <a:pPr/>
-              <a:t>12-Feb-19</a:t>
+              <a:t>24-Feb-19</a:t>
             </a:fld>
             <a:endParaRPr lang="en-US">
               <a:solidFill>
@@ -3574,7 +3574,7 @@
                 </a:solidFill>
               </a:rPr>
               <a:pPr/>
-              <a:t>12-Feb-19</a:t>
+              <a:t>24-Feb-19</a:t>
             </a:fld>
             <a:endParaRPr lang="en-US">
               <a:solidFill>
@@ -3773,7 +3773,7 @@
           <a:p>
             <a:fld id="{3171C7A2-A531-4824-AA77-C5182AC37427}" type="datetimeFigureOut">
               <a:rPr lang="en-US" smtClean="0"/>
-              <a:t>12-Feb-19</a:t>
+              <a:t>24-Feb-19</a:t>
             </a:fld>
             <a:endParaRPr lang="en-US"/>
           </a:p>
@@ -4035,7 +4035,7 @@
                 </a:solidFill>
               </a:rPr>
               <a:pPr/>
-              <a:t>12-Feb-19</a:t>
+              <a:t>24-Feb-19</a:t>
             </a:fld>
             <a:endParaRPr lang="en-US">
               <a:solidFill>
@@ -4239,7 +4239,7 @@
                 </a:solidFill>
               </a:rPr>
               <a:pPr/>
-              <a:t>12-Feb-19</a:t>
+              <a:t>24-Feb-19</a:t>
             </a:fld>
             <a:endParaRPr lang="en-US">
               <a:solidFill>
@@ -4453,7 +4453,7 @@
                 </a:solidFill>
               </a:rPr>
               <a:pPr/>
-              <a:t>12-Feb-19</a:t>
+              <a:t>24-Feb-19</a:t>
             </a:fld>
             <a:endParaRPr lang="en-US">
               <a:solidFill>
@@ -5039,7 +5039,7 @@
                 </a:solidFill>
               </a:rPr>
               <a:pPr/>
-              <a:t>12-Feb-19</a:t>
+              <a:t>24-Feb-19</a:t>
             </a:fld>
             <a:endParaRPr lang="en-US">
               <a:solidFill>
@@ -5264,7 +5264,7 @@
                 </a:solidFill>
               </a:rPr>
               <a:pPr/>
-              <a:t>12-Feb-19</a:t>
+              <a:t>24-Feb-19</a:t>
             </a:fld>
             <a:endParaRPr lang="en-US">
               <a:solidFill>
@@ -5522,7 +5522,7 @@
                 </a:solidFill>
               </a:rPr>
               <a:pPr/>
-              <a:t>12-Feb-19</a:t>
+              <a:t>24-Feb-19</a:t>
             </a:fld>
             <a:endParaRPr lang="en-US">
               <a:solidFill>
@@ -5844,7 +5844,7 @@
                 </a:solidFill>
               </a:rPr>
               <a:pPr/>
-              <a:t>12-Feb-19</a:t>
+              <a:t>24-Feb-19</a:t>
             </a:fld>
             <a:endParaRPr lang="en-US">
               <a:solidFill>
@@ -6306,7 +6306,7 @@
                 </a:solidFill>
               </a:rPr>
               <a:pPr/>
-              <a:t>12-Feb-19</a:t>
+              <a:t>24-Feb-19</a:t>
             </a:fld>
             <a:endParaRPr lang="en-US">
               <a:solidFill>
@@ -6458,7 +6458,7 @@
                 </a:solidFill>
               </a:rPr>
               <a:pPr/>
-              <a:t>12-Feb-19</a:t>
+              <a:t>24-Feb-19</a:t>
             </a:fld>
             <a:endParaRPr lang="en-US">
               <a:solidFill>
@@ -6587,7 +6587,7 @@
                 </a:solidFill>
               </a:rPr>
               <a:pPr/>
-              <a:t>12-Feb-19</a:t>
+              <a:t>24-Feb-19</a:t>
             </a:fld>
             <a:endParaRPr lang="en-US">
               <a:solidFill>
@@ -6862,7 +6862,7 @@
           <a:p>
             <a:fld id="{3171C7A2-A531-4824-AA77-C5182AC37427}" type="datetimeFigureOut">
               <a:rPr lang="en-US" smtClean="0"/>
-              <a:t>12-Feb-19</a:t>
+              <a:t>24-Feb-19</a:t>
             </a:fld>
             <a:endParaRPr lang="en-US"/>
           </a:p>
@@ -7144,7 +7144,7 @@
                 </a:solidFill>
               </a:rPr>
               <a:pPr/>
-              <a:t>12-Feb-19</a:t>
+              <a:t>24-Feb-19</a:t>
             </a:fld>
             <a:endParaRPr lang="en-US">
               <a:solidFill>
@@ -7435,7 +7435,7 @@
                 </a:solidFill>
               </a:rPr>
               <a:pPr/>
-              <a:t>12-Feb-19</a:t>
+              <a:t>24-Feb-19</a:t>
             </a:fld>
             <a:endParaRPr lang="en-US">
               <a:solidFill>
@@ -7639,7 +7639,7 @@
                 </a:solidFill>
               </a:rPr>
               <a:pPr/>
-              <a:t>12-Feb-19</a:t>
+              <a:t>24-Feb-19</a:t>
             </a:fld>
             <a:endParaRPr lang="en-US">
               <a:solidFill>
@@ -7853,7 +7853,7 @@
                 </a:solidFill>
               </a:rPr>
               <a:pPr/>
-              <a:t>12-Feb-19</a:t>
+              <a:t>24-Feb-19</a:t>
             </a:fld>
             <a:endParaRPr lang="en-US">
               <a:solidFill>
@@ -8114,7 +8114,7 @@
           <a:p>
             <a:fld id="{3171C7A2-A531-4824-AA77-C5182AC37427}" type="datetimeFigureOut">
               <a:rPr lang="en-US" smtClean="0"/>
-              <a:t>12-Feb-19</a:t>
+              <a:t>24-Feb-19</a:t>
             </a:fld>
             <a:endParaRPr lang="en-US"/>
           </a:p>
@@ -8481,7 +8481,7 @@
           <a:p>
             <a:fld id="{3171C7A2-A531-4824-AA77-C5182AC37427}" type="datetimeFigureOut">
               <a:rPr lang="en-US" smtClean="0"/>
-              <a:t>12-Feb-19</a:t>
+              <a:t>24-Feb-19</a:t>
             </a:fld>
             <a:endParaRPr lang="en-US"/>
           </a:p>
@@ -8599,7 +8599,7 @@
           <a:p>
             <a:fld id="{3171C7A2-A531-4824-AA77-C5182AC37427}" type="datetimeFigureOut">
               <a:rPr lang="en-US" smtClean="0"/>
-              <a:t>12-Feb-19</a:t>
+              <a:t>24-Feb-19</a:t>
             </a:fld>
             <a:endParaRPr lang="en-US"/>
           </a:p>
@@ -8694,7 +8694,7 @@
           <a:p>
             <a:fld id="{3171C7A2-A531-4824-AA77-C5182AC37427}" type="datetimeFigureOut">
               <a:rPr lang="en-US" smtClean="0"/>
-              <a:t>12-Feb-19</a:t>
+              <a:t>24-Feb-19</a:t>
             </a:fld>
             <a:endParaRPr lang="en-US"/>
           </a:p>
@@ -8971,7 +8971,7 @@
           <a:p>
             <a:fld id="{3171C7A2-A531-4824-AA77-C5182AC37427}" type="datetimeFigureOut">
               <a:rPr lang="en-US" smtClean="0"/>
-              <a:t>12-Feb-19</a:t>
+              <a:t>24-Feb-19</a:t>
             </a:fld>
             <a:endParaRPr lang="en-US"/>
           </a:p>
@@ -9224,7 +9224,7 @@
           <a:p>
             <a:fld id="{3171C7A2-A531-4824-AA77-C5182AC37427}" type="datetimeFigureOut">
               <a:rPr lang="en-US" smtClean="0"/>
-              <a:t>12-Feb-19</a:t>
+              <a:t>24-Feb-19</a:t>
             </a:fld>
             <a:endParaRPr lang="en-US"/>
           </a:p>
@@ -9437,7 +9437,7 @@
           <a:p>
             <a:fld id="{3171C7A2-A531-4824-AA77-C5182AC37427}" type="datetimeFigureOut">
               <a:rPr lang="en-US" smtClean="0"/>
-              <a:t>12-Feb-19</a:t>
+              <a:t>24-Feb-19</a:t>
             </a:fld>
             <a:endParaRPr lang="en-US"/>
           </a:p>
@@ -10290,7 +10290,7 @@
                 </a:solidFill>
               </a:rPr>
               <a:pPr/>
-              <a:t>12-Feb-19</a:t>
+              <a:t>24-Feb-19</a:t>
             </a:fld>
             <a:endParaRPr lang="en-US">
               <a:solidFill>
@@ -11229,7 +11229,7 @@
                 </a:solidFill>
               </a:rPr>
               <a:pPr/>
-              <a:t>12-Feb-19</a:t>
+              <a:t>24-Feb-19</a:t>
             </a:fld>
             <a:endParaRPr lang="en-US">
               <a:solidFill>
@@ -12262,7 +12262,7 @@
       </p:sp>
       <p:pic>
         <p:nvPicPr>
-          <p:cNvPr id="5" name="Picture 4"/>
+          <p:cNvPr id="4" name="Picture 3"/>
           <p:cNvPicPr>
             <a:picLocks noChangeAspect="1"/>
           </p:cNvPicPr>
@@ -12276,8 +12276,8 @@
         </p:blipFill>
         <p:spPr>
           <a:xfrm>
-            <a:off x="1054290" y="2014632"/>
-            <a:ext cx="10299510" cy="4250766"/>
+            <a:off x="738357" y="2014632"/>
+            <a:ext cx="10715286" cy="4422364"/>
           </a:xfrm>
           <a:prstGeom prst="rect">
             <a:avLst/>
@@ -14030,7 +14030,7 @@
             </a:r>
             <a:r>
               <a:rPr lang="en-US" dirty="0" smtClean="0"/>
-              <a:t>for Frontend Design</a:t>
+              <a:t>for Frontend Development</a:t>
             </a:r>
           </a:p>
           <a:p>
@@ -14044,8 +14044,13 @@
             </a:r>
             <a:r>
               <a:rPr lang="en-US" dirty="0" smtClean="0"/>
-              <a:t> Framework for Backend Design</a:t>
-            </a:r>
+              <a:t> Framework for Backend </a:t>
+            </a:r>
+            <a:r>
+              <a:rPr lang="en-US" dirty="0" smtClean="0"/>
+              <a:t>Development</a:t>
+            </a:r>
+            <a:endParaRPr lang="en-US" dirty="0" smtClean="0"/>
           </a:p>
           <a:p>
             <a:pPr>
@@ -15531,13 +15536,13 @@
   <p:clrMapOvr>
     <a:masterClrMapping/>
   </p:clrMapOvr>
-  <mc:AlternateContent xmlns:mc="http://schemas.openxmlformats.org/markup-compatibility/2006">
-    <mc:Choice xmlns:p14="http://schemas.microsoft.com/office/powerpoint/2010/main" Requires="p14">
+  <mc:AlternateContent xmlns:mc="http://schemas.openxmlformats.org/markup-compatibility/2006" xmlns:p14="http://schemas.microsoft.com/office/powerpoint/2010/main">
+    <mc:Choice Requires="p14">
       <p:transition spd="med" p14:dur="700">
         <p:fade/>
       </p:transition>
     </mc:Choice>
-    <mc:Fallback>
+    <mc:Fallback xmlns="">
       <p:transition spd="med">
         <p:fade/>
       </p:transition>

</xml_diff>